<commit_message>
misc typos from Jim
</commit_message>
<xml_diff>
--- a/Slides/Lesson 6.1 Lists vs. Structures.pptx
+++ b/Slides/Lesson 6.1 Lists vs. Structures.pptx
@@ -228,7 +228,7 @@
           <a:p>
             <a:fld id="{1AC50D25-69DA-4251-A3B1-10895C6A89D6}" type="datetimeFigureOut">
               <a:rPr lang="en-US" smtClean="0"/>
-              <a:t>8/31/2015</a:t>
+              <a:t>10/17/2015</a:t>
             </a:fld>
             <a:endParaRPr lang="en-US"/>
           </a:p>
@@ -1366,7 +1366,7 @@
           <a:p>
             <a:fld id="{2F1F79F5-7BEC-496A-AFC7-876E38F64D71}" type="datetime1">
               <a:rPr lang="en-US" smtClean="0"/>
-              <a:t>8/31/2015</a:t>
+              <a:t>10/17/2015</a:t>
             </a:fld>
             <a:endParaRPr lang="en-US"/>
           </a:p>
@@ -1468,7 +1468,7 @@
           <a:p>
             <a:fld id="{0A05703A-7669-4FEA-9056-25299B4D29D4}" type="datetime1">
               <a:rPr lang="en-US" smtClean="0"/>
-              <a:t>8/31/2015</a:t>
+              <a:t>10/17/2015</a:t>
             </a:fld>
             <a:endParaRPr lang="en-US"/>
           </a:p>
@@ -1745,7 +1745,7 @@
           <a:p>
             <a:fld id="{6E5077B5-BB57-49DB-88CA-226A139E5C01}" type="datetime1">
               <a:rPr lang="en-US" smtClean="0"/>
-              <a:t>8/31/2015</a:t>
+              <a:t>10/17/2015</a:t>
             </a:fld>
             <a:endParaRPr lang="en-US"/>
           </a:p>
@@ -1998,7 +1998,7 @@
           <a:p>
             <a:fld id="{C48D9447-CBD6-49A1-89FD-8512A8CF8999}" type="datetime1">
               <a:rPr lang="en-US" smtClean="0"/>
-              <a:t>8/31/2015</a:t>
+              <a:t>10/17/2015</a:t>
             </a:fld>
             <a:endParaRPr lang="en-US"/>
           </a:p>
@@ -2168,7 +2168,7 @@
           <a:p>
             <a:fld id="{A3639A2A-823D-48B7-9ACE-7FAF42870BA9}" type="datetime1">
               <a:rPr lang="en-US" smtClean="0"/>
-              <a:t>8/31/2015</a:t>
+              <a:t>10/17/2015</a:t>
             </a:fld>
             <a:endParaRPr lang="en-US"/>
           </a:p>
@@ -2348,7 +2348,7 @@
           <a:p>
             <a:fld id="{ED1B6996-82E9-463C-972C-7B56056E426C}" type="datetime1">
               <a:rPr lang="en-US" smtClean="0"/>
-              <a:t>8/31/2015</a:t>
+              <a:t>10/17/2015</a:t>
             </a:fld>
             <a:endParaRPr lang="en-US"/>
           </a:p>
@@ -2531,7 +2531,7 @@
           <a:p>
             <a:fld id="{E22ED4DA-448D-4BB1-B935-CC112220207B}" type="datetime1">
               <a:rPr lang="en-US" smtClean="0"/>
-              <a:t>8/31/2015</a:t>
+              <a:t>10/17/2015</a:t>
             </a:fld>
             <a:endParaRPr lang="en-US"/>
           </a:p>
@@ -2713,7 +2713,7 @@
           <a:p>
             <a:fld id="{E22ED4DA-448D-4BB1-B935-CC112220207B}" type="datetime1">
               <a:rPr lang="en-US" smtClean="0"/>
-              <a:t>8/31/2015</a:t>
+              <a:t>10/17/2015</a:t>
             </a:fld>
             <a:endParaRPr lang="en-US"/>
           </a:p>
@@ -2982,7 +2982,7 @@
           <a:p>
             <a:fld id="{FF5D65A6-AB94-4435-B0B7-3743215FA46C}" type="datetime1">
               <a:rPr lang="en-US" smtClean="0"/>
-              <a:t>8/31/2015</a:t>
+              <a:t>10/17/2015</a:t>
             </a:fld>
             <a:endParaRPr lang="en-US"/>
           </a:p>
@@ -3167,7 +3167,7 @@
           <a:p>
             <a:fld id="{FF5D65A6-AB94-4435-B0B7-3743215FA46C}" type="datetime1">
               <a:rPr lang="en-US" smtClean="0"/>
-              <a:t>8/31/2015</a:t>
+              <a:t>10/17/2015</a:t>
             </a:fld>
             <a:endParaRPr lang="en-US"/>
           </a:p>
@@ -3469,7 +3469,7 @@
           <a:p>
             <a:fld id="{7C193DC4-6EF0-48C9-B29C-616106A645E1}" type="datetime1">
               <a:rPr lang="en-US" smtClean="0"/>
-              <a:t>8/31/2015</a:t>
+              <a:t>10/17/2015</a:t>
             </a:fld>
             <a:endParaRPr lang="en-US"/>
           </a:p>
@@ -3757,7 +3757,7 @@
           <a:p>
             <a:fld id="{5D1846AD-9252-4647-9435-4C2AC365653A}" type="datetime1">
               <a:rPr lang="en-US" smtClean="0"/>
-              <a:t>8/31/2015</a:t>
+              <a:t>10/17/2015</a:t>
             </a:fld>
             <a:endParaRPr lang="en-US"/>
           </a:p>
@@ -4179,7 +4179,7 @@
           <a:p>
             <a:fld id="{CE56DC10-3561-4063-A6AF-C1CC7A41040A}" type="datetime1">
               <a:rPr lang="en-US" smtClean="0"/>
-              <a:t>8/31/2015</a:t>
+              <a:t>10/17/2015</a:t>
             </a:fld>
             <a:endParaRPr lang="en-US"/>
           </a:p>
@@ -4297,7 +4297,7 @@
           <a:p>
             <a:fld id="{2F7B77F5-1464-4F6B-92A8-64FC8A508293}" type="datetime1">
               <a:rPr lang="en-US" smtClean="0"/>
-              <a:t>8/31/2015</a:t>
+              <a:t>10/17/2015</a:t>
             </a:fld>
             <a:endParaRPr lang="en-US"/>
           </a:p>
@@ -4529,7 +4529,7 @@
           <a:p>
             <a:fld id="{02B3F677-983B-48DB-ADFD-63FE6CBC7FB2}" type="datetime1">
               <a:rPr lang="en-US" smtClean="0"/>
-              <a:t>8/31/2015</a:t>
+              <a:t>10/17/2015</a:t>
             </a:fld>
             <a:endParaRPr lang="en-US"/>
           </a:p>
@@ -5074,7 +5074,6 @@
                 <a:rPr lang="en-US" sz="1000" dirty="0" smtClean="0"/>
                 <a:t>2012-2015</a:t>
               </a:r>
-              <a:endParaRPr lang="en-US" sz="1000" dirty="0" smtClean="0"/>
             </a:p>
             <a:p>
               <a:r>
@@ -5311,14 +5310,7 @@
                 <a:latin typeface="Consolas" pitchFamily="49" charset="0"/>
                 <a:cs typeface="Consolas" pitchFamily="49" charset="0"/>
               </a:rPr>
-              <a:t>-- </a:t>
-            </a:r>
-            <a:r>
-              <a:rPr lang="en-US" sz="2400" b="1" dirty="0" smtClean="0">
-                <a:latin typeface="Consolas" pitchFamily="49" charset="0"/>
-                <a:cs typeface="Consolas" pitchFamily="49" charset="0"/>
-              </a:rPr>
-              <a:t>(make-topped-pizza Topping </a:t>
+              <a:t>-- (make-topped-pizza Topping </a:t>
             </a:r>
             <a:r>
               <a:rPr lang="en-US" sz="2400" b="1" dirty="0" smtClean="0">
@@ -5922,19 +5914,8 @@
                 <a:latin typeface="Consolas" pitchFamily="49" charset="0"/>
                 <a:cs typeface="Consolas" pitchFamily="49" charset="0"/>
               </a:rPr>
-              <a:t>                                </a:t>
-            </a:r>
-            <a:r>
-              <a:rPr lang="en-US" sz="2000" b="1" dirty="0" smtClean="0">
-                <a:latin typeface="Consolas" pitchFamily="49" charset="0"/>
-                <a:cs typeface="Consolas" pitchFamily="49" charset="0"/>
-              </a:rPr>
-              <a:t>(make-plain-pizza)</a:t>
-            </a:r>
-            <a:endParaRPr lang="en-US" sz="2000" b="1" dirty="0" smtClean="0">
-              <a:latin typeface="Consolas" pitchFamily="49" charset="0"/>
-              <a:cs typeface="Consolas" pitchFamily="49" charset="0"/>
-            </a:endParaRPr>
+              <a:t>                                (make-plain-pizza)</a:t>
+            </a:r>
           </a:p>
           <a:p>
             <a:pPr>
@@ -5954,19 +5935,8 @@
                 <a:latin typeface="Consolas" pitchFamily="49" charset="0"/>
                 <a:cs typeface="Consolas" pitchFamily="49" charset="0"/>
               </a:rPr>
-              <a:t>    (make-topped-pizza "cheese" </a:t>
-            </a:r>
-            <a:r>
-              <a:rPr lang="en-US" sz="2000" b="1" dirty="0" smtClean="0">
-                <a:latin typeface="Consolas" pitchFamily="49" charset="0"/>
-                <a:cs typeface="Consolas" pitchFamily="49" charset="0"/>
-              </a:rPr>
-              <a:t>(make-plain-pizza))</a:t>
-            </a:r>
-            <a:endParaRPr lang="en-US" sz="2000" b="1" dirty="0" smtClean="0">
-              <a:latin typeface="Consolas" pitchFamily="49" charset="0"/>
-              <a:cs typeface="Consolas" pitchFamily="49" charset="0"/>
-            </a:endParaRPr>
+              <a:t>    (make-topped-pizza "cheese" (make-plain-pizza))</a:t>
+            </a:r>
           </a:p>
           <a:p>
             <a:pPr>
@@ -5998,19 +5968,8 @@
                 <a:latin typeface="Consolas" pitchFamily="49" charset="0"/>
                 <a:cs typeface="Consolas" pitchFamily="49" charset="0"/>
               </a:rPr>
-              <a:t>    (make-topped-pizza "cheese" </a:t>
-            </a:r>
-            <a:r>
-              <a:rPr lang="en-US" sz="2000" b="1" dirty="0" smtClean="0">
-                <a:latin typeface="Consolas" pitchFamily="49" charset="0"/>
-                <a:cs typeface="Consolas" pitchFamily="49" charset="0"/>
-              </a:rPr>
-              <a:t>(make-plain-pizza))))</a:t>
-            </a:r>
-            <a:endParaRPr lang="en-US" sz="2000" b="1" dirty="0" smtClean="0">
-              <a:latin typeface="Consolas" pitchFamily="49" charset="0"/>
-              <a:cs typeface="Consolas" pitchFamily="49" charset="0"/>
-            </a:endParaRPr>
+              <a:t>    (make-topped-pizza "cheese" (make-plain-pizza))))</a:t>
+            </a:r>
           </a:p>
           <a:p>
             <a:pPr>
@@ -6054,19 +6013,8 @@
                 <a:latin typeface="Consolas" pitchFamily="49" charset="0"/>
                 <a:cs typeface="Consolas" pitchFamily="49" charset="0"/>
               </a:rPr>
-              <a:t>    (make-topped-pizza "cheese" </a:t>
-            </a:r>
-            <a:r>
-              <a:rPr lang="en-US" sz="2000" b="1" dirty="0" smtClean="0">
-                <a:latin typeface="Consolas" pitchFamily="49" charset="0"/>
-                <a:cs typeface="Consolas" pitchFamily="49" charset="0"/>
-              </a:rPr>
-              <a:t>(make-plain-pizza))))))</a:t>
-            </a:r>
-            <a:endParaRPr lang="en-US" sz="2000" b="1" dirty="0" smtClean="0">
-              <a:latin typeface="Consolas" pitchFamily="49" charset="0"/>
-              <a:cs typeface="Consolas" pitchFamily="49" charset="0"/>
-            </a:endParaRPr>
+              <a:t>    (make-topped-pizza "cheese" (make-plain-pizza))))))</a:t>
+            </a:r>
           </a:p>
           <a:p>
             <a:pPr>
@@ -7454,19 +7402,8 @@
                 <a:latin typeface="Consolas" pitchFamily="49" charset="0"/>
                 <a:cs typeface="Consolas" pitchFamily="49" charset="0"/>
               </a:rPr>
-              <a:t>-- </a:t>
-            </a:r>
-            <a:r>
-              <a:rPr lang="en-US" sz="2600" b="1" dirty="0" smtClean="0">
-                <a:latin typeface="Consolas" pitchFamily="49" charset="0"/>
-                <a:cs typeface="Consolas" pitchFamily="49" charset="0"/>
-              </a:rPr>
-              <a:t>(make-plain-pizza)</a:t>
-            </a:r>
-            <a:endParaRPr lang="en-US" sz="2600" b="1" dirty="0" smtClean="0">
-              <a:latin typeface="Consolas" pitchFamily="49" charset="0"/>
-              <a:cs typeface="Consolas" pitchFamily="49" charset="0"/>
-            </a:endParaRPr>
+              <a:t>-- (make-plain-pizza)</a:t>
+            </a:r>
           </a:p>
           <a:p>
             <a:pPr>
@@ -7529,14 +7466,7 @@
                 <a:latin typeface="Consolas" pitchFamily="49" charset="0"/>
                 <a:cs typeface="Consolas" pitchFamily="49" charset="0"/>
               </a:rPr>
-              <a:t>(make-plain-pizza) </a:t>
-            </a:r>
-            <a:r>
-              <a:rPr lang="en-US" sz="2600" b="1" dirty="0" smtClean="0">
-                <a:latin typeface="Consolas" pitchFamily="49" charset="0"/>
-                <a:cs typeface="Consolas" pitchFamily="49" charset="0"/>
-              </a:rPr>
-              <a:t>means a pizza with no toppings</a:t>
+              <a:t>(make-plain-pizza) means a pizza with no toppings</a:t>
             </a:r>
           </a:p>
           <a:p>
@@ -8724,15 +8654,7 @@
           <a:p>
             <a:r>
               <a:rPr lang="en-US" dirty="0" smtClean="0"/>
-              <a:t>Do Guided </a:t>
-            </a:r>
-            <a:r>
-              <a:rPr lang="en-US" dirty="0" smtClean="0"/>
-              <a:t>Practice </a:t>
-            </a:r>
-            <a:r>
-              <a:rPr lang="en-US" dirty="0" smtClean="0"/>
-              <a:t>6.1 </a:t>
+              <a:t>Do Guided Practice 6.1 </a:t>
             </a:r>
           </a:p>
           <a:p>
@@ -11631,13 +11553,7 @@
               <a:rPr lang="en-US" dirty="0" smtClean="0">
                 <a:cs typeface="Consolas" pitchFamily="49" charset="0"/>
               </a:rPr>
-              <a:t>We could still write a data definition</a:t>
-            </a:r>
-            <a:r>
-              <a:rPr lang="en-US" dirty="0" smtClean="0">
-                <a:cs typeface="Consolas" pitchFamily="49" charset="0"/>
-              </a:rPr>
-              <a:t>:</a:t>
+              <a:t>We could still write a data definition:</a:t>
             </a:r>
           </a:p>
           <a:p>
@@ -11699,21 +11615,7 @@
                 <a:latin typeface="Consolas" pitchFamily="49" charset="0"/>
                 <a:cs typeface="Consolas" pitchFamily="49" charset="0"/>
               </a:rPr>
-              <a:t>(</a:t>
-            </a:r>
-            <a:r>
-              <a:rPr lang="en-US" sz="2000" b="1" dirty="0" smtClean="0">
-                <a:latin typeface="Consolas" pitchFamily="49" charset="0"/>
-                <a:cs typeface="Consolas" pitchFamily="49" charset="0"/>
-              </a:rPr>
-              <a:t>define-struct topped-pizza (topping base</a:t>
-            </a:r>
-            <a:r>
-              <a:rPr lang="en-US" sz="2000" b="1" dirty="0" smtClean="0">
-                <a:latin typeface="Consolas" pitchFamily="49" charset="0"/>
-                <a:cs typeface="Consolas" pitchFamily="49" charset="0"/>
-              </a:rPr>
-              <a:t>))</a:t>
+              <a:t>(define-struct topped-pizza (topping base))</a:t>
             </a:r>
           </a:p>
           <a:p>
@@ -11740,14 +11642,7 @@
                 <a:latin typeface="Consolas" pitchFamily="49" charset="0"/>
                 <a:cs typeface="Consolas" pitchFamily="49" charset="0"/>
               </a:rPr>
-              <a:t>A Topping is a String</a:t>
-            </a:r>
-            <a:r>
-              <a:rPr lang="en-US" sz="2000" b="1" dirty="0" smtClean="0">
-                <a:latin typeface="Consolas" pitchFamily="49" charset="0"/>
-                <a:cs typeface="Consolas" pitchFamily="49" charset="0"/>
-              </a:rPr>
-              <a:t>.</a:t>
+              <a:t>A Topping is a String.</a:t>
             </a:r>
           </a:p>
           <a:p>
@@ -11774,14 +11669,7 @@
                 <a:latin typeface="Consolas" pitchFamily="49" charset="0"/>
                 <a:cs typeface="Consolas" pitchFamily="49" charset="0"/>
               </a:rPr>
-              <a:t>A Pizza is </a:t>
-            </a:r>
-            <a:r>
-              <a:rPr lang="en-US" sz="2000" b="1" dirty="0" smtClean="0">
-                <a:latin typeface="Consolas" pitchFamily="49" charset="0"/>
-                <a:cs typeface="Consolas" pitchFamily="49" charset="0"/>
-              </a:rPr>
-              <a:t>either</a:t>
+              <a:t>A Pizza is either</a:t>
             </a:r>
           </a:p>
           <a:p>
@@ -11829,14 +11717,7 @@
                 <a:latin typeface="Consolas" pitchFamily="49" charset="0"/>
                 <a:cs typeface="Consolas" pitchFamily="49" charset="0"/>
               </a:rPr>
-              <a:t>-- </a:t>
-            </a:r>
-            <a:r>
-              <a:rPr lang="en-US" sz="2000" b="1" dirty="0" smtClean="0">
-                <a:latin typeface="Consolas" pitchFamily="49" charset="0"/>
-                <a:cs typeface="Consolas" pitchFamily="49" charset="0"/>
-              </a:rPr>
-              <a:t>(make-topped-pizza Topping Pizza)</a:t>
+              <a:t>-- (make-topped-pizza Topping Pizza)</a:t>
             </a:r>
           </a:p>
           <a:p>
@@ -12070,7 +11951,31 @@
                   <a:schemeClr val="tx1"/>
                 </a:solidFill>
               </a:rPr>
-              <a:t>, is a standard strategy, sometimes called the "sum of products" representation.  HINT:  You won't go wrong is you use this as your default representation for data in Racket.</a:t>
+              <a:t>, is a standard strategy, sometimes called the "sum of products" representation.  HINT:  You won't go </a:t>
+            </a:r>
+            <a:r>
+              <a:rPr lang="en-US" sz="1400" smtClean="0">
+                <a:solidFill>
+                  <a:schemeClr val="tx1"/>
+                </a:solidFill>
+              </a:rPr>
+              <a:t>wrong </a:t>
+            </a:r>
+            <a:r>
+              <a:rPr lang="en-US" sz="1400" smtClean="0">
+                <a:solidFill>
+                  <a:schemeClr val="tx1"/>
+                </a:solidFill>
+              </a:rPr>
+              <a:t>if </a:t>
+            </a:r>
+            <a:r>
+              <a:rPr lang="en-US" sz="1400" dirty="0" smtClean="0">
+                <a:solidFill>
+                  <a:schemeClr val="tx1"/>
+                </a:solidFill>
+              </a:rPr>
+              <a:t>you use this as your default representation for data in Racket.</a:t>
             </a:r>
             <a:endParaRPr lang="en-US" sz="1400" dirty="0">
               <a:solidFill>

</xml_diff>

<commit_message>
changed colors in L6.3 for the color-blind. Put in refs to files throughout
</commit_message>
<xml_diff>
--- a/Slides/Lesson 6.1 Lists vs. Structures.pptx
+++ b/Slides/Lesson 6.1 Lists vs. Structures.pptx
@@ -228,7 +228,7 @@
           <a:p>
             <a:fld id="{1AC50D25-69DA-4251-A3B1-10895C6A89D6}" type="datetimeFigureOut">
               <a:rPr lang="en-US" smtClean="0"/>
-              <a:t>10/17/2015</a:t>
+              <a:t>10/19/2015</a:t>
             </a:fld>
             <a:endParaRPr lang="en-US"/>
           </a:p>
@@ -1366,7 +1366,7 @@
           <a:p>
             <a:fld id="{2F1F79F5-7BEC-496A-AFC7-876E38F64D71}" type="datetime1">
               <a:rPr lang="en-US" smtClean="0"/>
-              <a:t>10/17/2015</a:t>
+              <a:t>10/19/2015</a:t>
             </a:fld>
             <a:endParaRPr lang="en-US"/>
           </a:p>
@@ -1468,7 +1468,7 @@
           <a:p>
             <a:fld id="{0A05703A-7669-4FEA-9056-25299B4D29D4}" type="datetime1">
               <a:rPr lang="en-US" smtClean="0"/>
-              <a:t>10/17/2015</a:t>
+              <a:t>10/19/2015</a:t>
             </a:fld>
             <a:endParaRPr lang="en-US"/>
           </a:p>
@@ -1745,7 +1745,7 @@
           <a:p>
             <a:fld id="{6E5077B5-BB57-49DB-88CA-226A139E5C01}" type="datetime1">
               <a:rPr lang="en-US" smtClean="0"/>
-              <a:t>10/17/2015</a:t>
+              <a:t>10/19/2015</a:t>
             </a:fld>
             <a:endParaRPr lang="en-US"/>
           </a:p>
@@ -1998,7 +1998,7 @@
           <a:p>
             <a:fld id="{C48D9447-CBD6-49A1-89FD-8512A8CF8999}" type="datetime1">
               <a:rPr lang="en-US" smtClean="0"/>
-              <a:t>10/17/2015</a:t>
+              <a:t>10/19/2015</a:t>
             </a:fld>
             <a:endParaRPr lang="en-US"/>
           </a:p>
@@ -2168,7 +2168,7 @@
           <a:p>
             <a:fld id="{A3639A2A-823D-48B7-9ACE-7FAF42870BA9}" type="datetime1">
               <a:rPr lang="en-US" smtClean="0"/>
-              <a:t>10/17/2015</a:t>
+              <a:t>10/19/2015</a:t>
             </a:fld>
             <a:endParaRPr lang="en-US"/>
           </a:p>
@@ -2348,7 +2348,7 @@
           <a:p>
             <a:fld id="{ED1B6996-82E9-463C-972C-7B56056E426C}" type="datetime1">
               <a:rPr lang="en-US" smtClean="0"/>
-              <a:t>10/17/2015</a:t>
+              <a:t>10/19/2015</a:t>
             </a:fld>
             <a:endParaRPr lang="en-US"/>
           </a:p>
@@ -2531,7 +2531,7 @@
           <a:p>
             <a:fld id="{E22ED4DA-448D-4BB1-B935-CC112220207B}" type="datetime1">
               <a:rPr lang="en-US" smtClean="0"/>
-              <a:t>10/17/2015</a:t>
+              <a:t>10/19/2015</a:t>
             </a:fld>
             <a:endParaRPr lang="en-US"/>
           </a:p>
@@ -2713,7 +2713,7 @@
           <a:p>
             <a:fld id="{E22ED4DA-448D-4BB1-B935-CC112220207B}" type="datetime1">
               <a:rPr lang="en-US" smtClean="0"/>
-              <a:t>10/17/2015</a:t>
+              <a:t>10/19/2015</a:t>
             </a:fld>
             <a:endParaRPr lang="en-US"/>
           </a:p>
@@ -2982,7 +2982,7 @@
           <a:p>
             <a:fld id="{FF5D65A6-AB94-4435-B0B7-3743215FA46C}" type="datetime1">
               <a:rPr lang="en-US" smtClean="0"/>
-              <a:t>10/17/2015</a:t>
+              <a:t>10/19/2015</a:t>
             </a:fld>
             <a:endParaRPr lang="en-US"/>
           </a:p>
@@ -3167,7 +3167,7 @@
           <a:p>
             <a:fld id="{FF5D65A6-AB94-4435-B0B7-3743215FA46C}" type="datetime1">
               <a:rPr lang="en-US" smtClean="0"/>
-              <a:t>10/17/2015</a:t>
+              <a:t>10/19/2015</a:t>
             </a:fld>
             <a:endParaRPr lang="en-US"/>
           </a:p>
@@ -3469,7 +3469,7 @@
           <a:p>
             <a:fld id="{7C193DC4-6EF0-48C9-B29C-616106A645E1}" type="datetime1">
               <a:rPr lang="en-US" smtClean="0"/>
-              <a:t>10/17/2015</a:t>
+              <a:t>10/19/2015</a:t>
             </a:fld>
             <a:endParaRPr lang="en-US"/>
           </a:p>
@@ -3757,7 +3757,7 @@
           <a:p>
             <a:fld id="{5D1846AD-9252-4647-9435-4C2AC365653A}" type="datetime1">
               <a:rPr lang="en-US" smtClean="0"/>
-              <a:t>10/17/2015</a:t>
+              <a:t>10/19/2015</a:t>
             </a:fld>
             <a:endParaRPr lang="en-US"/>
           </a:p>
@@ -4179,7 +4179,7 @@
           <a:p>
             <a:fld id="{CE56DC10-3561-4063-A6AF-C1CC7A41040A}" type="datetime1">
               <a:rPr lang="en-US" smtClean="0"/>
-              <a:t>10/17/2015</a:t>
+              <a:t>10/19/2015</a:t>
             </a:fld>
             <a:endParaRPr lang="en-US"/>
           </a:p>
@@ -4297,7 +4297,7 @@
           <a:p>
             <a:fld id="{2F7B77F5-1464-4F6B-92A8-64FC8A508293}" type="datetime1">
               <a:rPr lang="en-US" smtClean="0"/>
-              <a:t>10/17/2015</a:t>
+              <a:t>10/19/2015</a:t>
             </a:fld>
             <a:endParaRPr lang="en-US"/>
           </a:p>
@@ -4529,7 +4529,7 @@
           <a:p>
             <a:fld id="{02B3F677-983B-48DB-ADFD-63FE6CBC7FB2}" type="datetime1">
               <a:rPr lang="en-US" smtClean="0"/>
-              <a:t>10/17/2015</a:t>
+              <a:t>10/19/2015</a:t>
             </a:fld>
             <a:endParaRPr lang="en-US"/>
           </a:p>
@@ -8648,7 +8648,21 @@
           <a:p>
             <a:r>
               <a:rPr lang="en-US" dirty="0" smtClean="0"/>
-              <a:t>If you have questions about this lesson, ask them on the Discussion Board</a:t>
+              <a:t>Study the file 06-1-recursive-structures.rkt in the </a:t>
+            </a:r>
+            <a:r>
+              <a:rPr lang="en-US" smtClean="0"/>
+              <a:t>Examples folder.</a:t>
+            </a:r>
+          </a:p>
+          <a:p>
+            <a:r>
+              <a:rPr lang="en-US" dirty="0" smtClean="0"/>
+              <a:t>If </a:t>
+            </a:r>
+            <a:r>
+              <a:rPr lang="en-US" dirty="0" smtClean="0"/>
+              <a:t>you have questions about this lesson, ask them on the Discussion Board</a:t>
             </a:r>
           </a:p>
           <a:p>
@@ -11959,15 +11973,7 @@
                   <a:schemeClr val="tx1"/>
                 </a:solidFill>
               </a:rPr>
-              <a:t>wrong </a:t>
-            </a:r>
-            <a:r>
-              <a:rPr lang="en-US" sz="1400" smtClean="0">
-                <a:solidFill>
-                  <a:schemeClr val="tx1"/>
-                </a:solidFill>
-              </a:rPr>
-              <a:t>if </a:t>
+              <a:t>wrong if </a:t>
             </a:r>
             <a:r>
               <a:rPr lang="en-US" sz="1400" dirty="0" smtClean="0">

</xml_diff>